<commit_message>
fix input question must have at least 2 words
</commit_message>
<xml_diff>
--- a/iLawyer_presentation.pptx
+++ b/iLawyer_presentation.pptx
@@ -5,7 +5,7 @@
     <p:sldMasterId id="2147483700" r:id="rId1"/>
   </p:sldMasterIdLst>
   <p:notesMasterIdLst>
-    <p:notesMasterId r:id="rId22"/>
+    <p:notesMasterId r:id="rId23"/>
   </p:notesMasterIdLst>
   <p:sldIdLst>
     <p:sldId id="256" r:id="rId2"/>
@@ -16,18 +16,19 @@
     <p:sldId id="262" r:id="rId7"/>
     <p:sldId id="263" r:id="rId8"/>
     <p:sldId id="264" r:id="rId9"/>
-    <p:sldId id="265" r:id="rId10"/>
-    <p:sldId id="266" r:id="rId11"/>
-    <p:sldId id="267" r:id="rId12"/>
-    <p:sldId id="268" r:id="rId13"/>
-    <p:sldId id="269" r:id="rId14"/>
-    <p:sldId id="270" r:id="rId15"/>
-    <p:sldId id="271" r:id="rId16"/>
-    <p:sldId id="272" r:id="rId17"/>
-    <p:sldId id="273" r:id="rId18"/>
-    <p:sldId id="274" r:id="rId19"/>
-    <p:sldId id="275" r:id="rId20"/>
-    <p:sldId id="276" r:id="rId21"/>
+    <p:sldId id="277" r:id="rId10"/>
+    <p:sldId id="265" r:id="rId11"/>
+    <p:sldId id="266" r:id="rId12"/>
+    <p:sldId id="267" r:id="rId13"/>
+    <p:sldId id="268" r:id="rId14"/>
+    <p:sldId id="269" r:id="rId15"/>
+    <p:sldId id="270" r:id="rId16"/>
+    <p:sldId id="271" r:id="rId17"/>
+    <p:sldId id="272" r:id="rId18"/>
+    <p:sldId id="273" r:id="rId19"/>
+    <p:sldId id="274" r:id="rId20"/>
+    <p:sldId id="275" r:id="rId21"/>
+    <p:sldId id="276" r:id="rId22"/>
   </p:sldIdLst>
   <p:sldSz cx="9144000" cy="6858000" type="screen4x3"/>
   <p:notesSz cx="6858000" cy="9144000"/>
@@ -227,7 +228,7 @@
           <a:p>
             <a:fld id="{574C7D7A-3C27-BD45-B260-8DAEB4DA204D}" type="datetimeFigureOut">
               <a:rPr lang="en-US" smtClean="0"/>
-              <a:t>3/19/18</a:t>
+              <a:t>3/20/18</a:t>
             </a:fld>
             <a:endParaRPr lang="en-US"/>
           </a:p>
@@ -820,7 +821,7 @@
           <a:p>
             <a:fld id="{79CE86BA-BB14-5447-A16D-79D6B456654C}" type="datetimeFigureOut">
               <a:rPr lang="en-US" smtClean="0"/>
-              <a:t>3/19/18</a:t>
+              <a:t>3/20/18</a:t>
             </a:fld>
             <a:endParaRPr lang="en-US"/>
           </a:p>
@@ -1252,7 +1253,7 @@
           <a:p>
             <a:fld id="{79CE86BA-BB14-5447-A16D-79D6B456654C}" type="datetimeFigureOut">
               <a:rPr lang="en-US" smtClean="0"/>
-              <a:t>3/19/18</a:t>
+              <a:t>3/20/18</a:t>
             </a:fld>
             <a:endParaRPr lang="en-US"/>
           </a:p>
@@ -1653,7 +1654,7 @@
           <a:p>
             <a:fld id="{79CE86BA-BB14-5447-A16D-79D6B456654C}" type="datetimeFigureOut">
               <a:rPr lang="en-US" smtClean="0"/>
-              <a:t>3/19/18</a:t>
+              <a:t>3/20/18</a:t>
             </a:fld>
             <a:endParaRPr lang="en-US"/>
           </a:p>
@@ -1766,7 +1767,7 @@
           <a:p>
             <a:fld id="{79CE86BA-BB14-5447-A16D-79D6B456654C}" type="datetimeFigureOut">
               <a:rPr lang="en-US" smtClean="0"/>
-              <a:t>3/19/18</a:t>
+              <a:t>3/20/18</a:t>
             </a:fld>
             <a:endParaRPr lang="en-US"/>
           </a:p>
@@ -2030,7 +2031,7 @@
           <a:p>
             <a:fld id="{79CE86BA-BB14-5447-A16D-79D6B456654C}" type="datetimeFigureOut">
               <a:rPr lang="en-US" smtClean="0"/>
-              <a:t>3/19/18</a:t>
+              <a:t>3/20/18</a:t>
             </a:fld>
             <a:endParaRPr lang="en-US"/>
           </a:p>
@@ -2270,7 +2271,7 @@
           <a:p>
             <a:fld id="{79CE86BA-BB14-5447-A16D-79D6B456654C}" type="datetimeFigureOut">
               <a:rPr lang="en-US" smtClean="0"/>
-              <a:t>3/19/18</a:t>
+              <a:t>3/20/18</a:t>
             </a:fld>
             <a:endParaRPr lang="en-US"/>
           </a:p>
@@ -2513,7 +2514,7 @@
           <a:p>
             <a:fld id="{79CE86BA-BB14-5447-A16D-79D6B456654C}" type="datetimeFigureOut">
               <a:rPr lang="en-US" smtClean="0"/>
-              <a:t>3/19/18</a:t>
+              <a:t>3/20/18</a:t>
             </a:fld>
             <a:endParaRPr lang="en-US"/>
           </a:p>
@@ -2785,7 +2786,7 @@
           <a:p>
             <a:fld id="{79CE86BA-BB14-5447-A16D-79D6B456654C}" type="datetimeFigureOut">
               <a:rPr lang="en-US" smtClean="0"/>
-              <a:t>3/19/18</a:t>
+              <a:t>3/20/18</a:t>
             </a:fld>
             <a:endParaRPr lang="en-US"/>
           </a:p>
@@ -3188,7 +3189,7 @@
           <a:p>
             <a:fld id="{79CE86BA-BB14-5447-A16D-79D6B456654C}" type="datetimeFigureOut">
               <a:rPr lang="en-US" smtClean="0"/>
-              <a:t>3/19/18</a:t>
+              <a:t>3/20/18</a:t>
             </a:fld>
             <a:endParaRPr lang="en-US"/>
           </a:p>
@@ -3529,7 +3530,7 @@
           <a:p>
             <a:fld id="{79CE86BA-BB14-5447-A16D-79D6B456654C}" type="datetimeFigureOut">
               <a:rPr lang="en-US" smtClean="0"/>
-              <a:t>3/19/18</a:t>
+              <a:t>3/20/18</a:t>
             </a:fld>
             <a:endParaRPr lang="en-US"/>
           </a:p>
@@ -4014,7 +4015,7 @@
           <a:p>
             <a:fld id="{79CE86BA-BB14-5447-A16D-79D6B456654C}" type="datetimeFigureOut">
               <a:rPr lang="en-US" smtClean="0"/>
-              <a:t>3/19/18</a:t>
+              <a:t>3/20/18</a:t>
             </a:fld>
             <a:endParaRPr lang="en-US"/>
           </a:p>
@@ -4151,7 +4152,7 @@
           <a:p>
             <a:fld id="{79CE86BA-BB14-5447-A16D-79D6B456654C}" type="datetimeFigureOut">
               <a:rPr lang="en-US" smtClean="0"/>
-              <a:t>3/19/18</a:t>
+              <a:t>3/20/18</a:t>
             </a:fld>
             <a:endParaRPr lang="en-US"/>
           </a:p>
@@ -4298,7 +4299,7 @@
           <a:p>
             <a:fld id="{79CE86BA-BB14-5447-A16D-79D6B456654C}" type="datetimeFigureOut">
               <a:rPr lang="en-US" smtClean="0"/>
-              <a:t>3/19/18</a:t>
+              <a:t>3/20/18</a:t>
             </a:fld>
             <a:endParaRPr lang="en-US"/>
           </a:p>
@@ -4679,7 +4680,7 @@
           <a:p>
             <a:fld id="{79CE86BA-BB14-5447-A16D-79D6B456654C}" type="datetimeFigureOut">
               <a:rPr lang="en-US" smtClean="0"/>
-              <a:t>3/19/18</a:t>
+              <a:t>3/20/18</a:t>
             </a:fld>
             <a:endParaRPr lang="en-US"/>
           </a:p>
@@ -4975,7 +4976,7 @@
           <a:p>
             <a:fld id="{79CE86BA-BB14-5447-A16D-79D6B456654C}" type="datetimeFigureOut">
               <a:rPr lang="en-US" smtClean="0"/>
-              <a:t>3/19/18</a:t>
+              <a:t>3/20/18</a:t>
             </a:fld>
             <a:endParaRPr lang="en-US"/>
           </a:p>
@@ -5571,11 +5572,69 @@
           <a:lstStyle/>
           <a:p>
             <a:r>
+              <a:rPr lang="en-US" dirty="0">
+                <a:latin typeface="Times New Roman" panose="02020603050405020304" pitchFamily="18" charset="0"/>
+                <a:cs typeface="Times New Roman" panose="02020603050405020304" pitchFamily="18" charset="0"/>
+              </a:rPr>
+              <a:t>5.1. Training</a:t>
+            </a:r>
+          </a:p>
+        </p:txBody>
+      </p:sp>
+      <p:sp>
+        <p:nvSpPr>
+          <p:cNvPr id="3" name="Content Placeholder 2"/>
+          <p:cNvSpPr>
+            <a:spLocks noGrp="1"/>
+          </p:cNvSpPr>
+          <p:nvPr>
+            <p:ph idx="1"/>
+          </p:nvPr>
+        </p:nvSpPr>
+        <p:spPr/>
+        <p:txBody>
+          <a:bodyPr>
+            <a:normAutofit/>
+          </a:bodyPr>
+          <a:lstStyle/>
+          <a:p>
+            <a:pPr algn="just"/>
+            <a:r>
               <a:rPr lang="vi-VN" dirty="0">
                 <a:latin typeface="Times New Roman" panose="02020603050405020304" pitchFamily="18" charset="0"/>
                 <a:cs typeface="Times New Roman" panose="02020603050405020304" pitchFamily="18" charset="0"/>
               </a:rPr>
-              <a:t>6. Kết luận</a:t>
+              <a:t>Sử dụng neural network áp dụng cho training dataset</a:t>
+            </a:r>
+          </a:p>
+          <a:p>
+            <a:pPr lvl="1" algn="just"/>
+            <a:r>
+              <a:rPr lang="vi-VN" dirty="0">
+                <a:latin typeface="Times New Roman" panose="02020603050405020304" pitchFamily="18" charset="0"/>
+                <a:cs typeface="Times New Roman" panose="02020603050405020304" pitchFamily="18" charset="0"/>
+              </a:rPr>
+              <a:t>Input Layer: câu hỏi (được đặc trưng bởi vector)</a:t>
+            </a:r>
+          </a:p>
+          <a:p>
+            <a:pPr lvl="1" algn="just"/>
+            <a:r>
+              <a:rPr lang="vi-VN" dirty="0">
+                <a:latin typeface="Times New Roman" panose="02020603050405020304" pitchFamily="18" charset="0"/>
+                <a:cs typeface="Times New Roman" panose="02020603050405020304" pitchFamily="18" charset="0"/>
+              </a:rPr>
+              <a:t>Output Layer: điều luật tương ứng với câu hỏi</a:t>
+            </a:r>
+          </a:p>
+          <a:p>
+            <a:pPr lvl="1" algn="just"/>
+            <a:r>
+              <a:rPr lang="vi-VN" dirty="0">
+                <a:latin typeface="Times New Roman" panose="02020603050405020304" pitchFamily="18" charset="0"/>
+                <a:cs typeface="Times New Roman" panose="02020603050405020304" pitchFamily="18" charset="0"/>
+              </a:rPr>
+              <a:t>Hidden Layer: các đặc trưng được quy định trong quá trình training</a:t>
             </a:r>
             <a:endParaRPr lang="en-US" dirty="0">
               <a:latin typeface="Times New Roman" panose="02020603050405020304" pitchFamily="18" charset="0"/>
@@ -5584,35 +5643,10 @@
           </a:p>
         </p:txBody>
       </p:sp>
-      <p:sp>
-        <p:nvSpPr>
-          <p:cNvPr id="3" name="Content Placeholder 2"/>
-          <p:cNvSpPr>
-            <a:spLocks noGrp="1"/>
-          </p:cNvSpPr>
-          <p:nvPr>
-            <p:ph idx="1"/>
-          </p:nvPr>
-        </p:nvSpPr>
-        <p:spPr/>
-        <p:txBody>
-          <a:bodyPr>
-            <a:normAutofit/>
-          </a:bodyPr>
-          <a:lstStyle/>
-          <a:p>
-            <a:pPr algn="just"/>
-            <a:endParaRPr lang="en-US" dirty="0">
-              <a:latin typeface="Times New Roman" panose="02020603050405020304" pitchFamily="18" charset="0"/>
-              <a:cs typeface="Times New Roman" panose="02020603050405020304" pitchFamily="18" charset="0"/>
-            </a:endParaRPr>
-          </a:p>
-        </p:txBody>
-      </p:sp>
     </p:spTree>
     <p:extLst>
       <p:ext uri="{BB962C8B-B14F-4D97-AF65-F5344CB8AC3E}">
-        <p14:creationId xmlns:p14="http://schemas.microsoft.com/office/powerpoint/2010/main" val="2488910968"/>
+        <p14:creationId xmlns:p14="http://schemas.microsoft.com/office/powerpoint/2010/main" val="444544940"/>
       </p:ext>
     </p:extLst>
   </p:cSld>
@@ -5654,6 +5688,13 @@
           <a:bodyPr/>
           <a:lstStyle/>
           <a:p>
+            <a:r>
+              <a:rPr lang="vi-VN" dirty="0">
+                <a:latin typeface="Times New Roman" panose="02020603050405020304" pitchFamily="18" charset="0"/>
+                <a:cs typeface="Times New Roman" panose="02020603050405020304" pitchFamily="18" charset="0"/>
+              </a:rPr>
+              <a:t>5.2. Testing performance</a:t>
+            </a:r>
             <a:endParaRPr lang="en-US" dirty="0">
               <a:latin typeface="Times New Roman" panose="02020603050405020304" pitchFamily="18" charset="0"/>
               <a:cs typeface="Times New Roman" panose="02020603050405020304" pitchFamily="18" charset="0"/>
@@ -5679,6 +5720,28 @@
           <a:lstStyle/>
           <a:p>
             <a:pPr algn="just"/>
+            <a:r>
+              <a:rPr lang="vi-VN" dirty="0">
+                <a:latin typeface="Times New Roman" panose="02020603050405020304" pitchFamily="18" charset="0"/>
+                <a:cs typeface="Times New Roman" panose="02020603050405020304" pitchFamily="18" charset="0"/>
+              </a:rPr>
+              <a:t>Training set: 370 câu hỏi – 97, 03 %</a:t>
+            </a:r>
+          </a:p>
+          <a:p>
+            <a:pPr algn="just"/>
+            <a:r>
+              <a:rPr lang="vi-VN" dirty="0">
+                <a:latin typeface="Times New Roman" panose="02020603050405020304" pitchFamily="18" charset="0"/>
+                <a:cs typeface="Times New Roman" panose="02020603050405020304" pitchFamily="18" charset="0"/>
+              </a:rPr>
+              <a:t>Test set: 110 câu hỏi – 83, 6%</a:t>
+            </a:r>
+          </a:p>
+          <a:p>
+            <a:pPr marL="0" indent="0" algn="just">
+              <a:buNone/>
+            </a:pPr>
             <a:endParaRPr lang="en-US" dirty="0">
               <a:latin typeface="Times New Roman" panose="02020603050405020304" pitchFamily="18" charset="0"/>
               <a:cs typeface="Times New Roman" panose="02020603050405020304" pitchFamily="18" charset="0"/>
@@ -5689,7 +5752,7 @@
     </p:spTree>
     <p:extLst>
       <p:ext uri="{BB962C8B-B14F-4D97-AF65-F5344CB8AC3E}">
-        <p14:creationId xmlns:p14="http://schemas.microsoft.com/office/powerpoint/2010/main" val="3929544239"/>
+        <p14:creationId xmlns:p14="http://schemas.microsoft.com/office/powerpoint/2010/main" val="2488910968"/>
       </p:ext>
     </p:extLst>
   </p:cSld>
@@ -5766,7 +5829,7 @@
     </p:spTree>
     <p:extLst>
       <p:ext uri="{BB962C8B-B14F-4D97-AF65-F5344CB8AC3E}">
-        <p14:creationId xmlns:p14="http://schemas.microsoft.com/office/powerpoint/2010/main" val="1429311864"/>
+        <p14:creationId xmlns:p14="http://schemas.microsoft.com/office/powerpoint/2010/main" val="3929544239"/>
       </p:ext>
     </p:extLst>
   </p:cSld>
@@ -5843,7 +5906,7 @@
     </p:spTree>
     <p:extLst>
       <p:ext uri="{BB962C8B-B14F-4D97-AF65-F5344CB8AC3E}">
-        <p14:creationId xmlns:p14="http://schemas.microsoft.com/office/powerpoint/2010/main" val="881036220"/>
+        <p14:creationId xmlns:p14="http://schemas.microsoft.com/office/powerpoint/2010/main" val="1429311864"/>
       </p:ext>
     </p:extLst>
   </p:cSld>
@@ -5920,7 +5983,7 @@
     </p:spTree>
     <p:extLst>
       <p:ext uri="{BB962C8B-B14F-4D97-AF65-F5344CB8AC3E}">
-        <p14:creationId xmlns:p14="http://schemas.microsoft.com/office/powerpoint/2010/main" val="3593449306"/>
+        <p14:creationId xmlns:p14="http://schemas.microsoft.com/office/powerpoint/2010/main" val="881036220"/>
       </p:ext>
     </p:extLst>
   </p:cSld>
@@ -5997,7 +6060,7 @@
     </p:spTree>
     <p:extLst>
       <p:ext uri="{BB962C8B-B14F-4D97-AF65-F5344CB8AC3E}">
-        <p14:creationId xmlns:p14="http://schemas.microsoft.com/office/powerpoint/2010/main" val="2828349501"/>
+        <p14:creationId xmlns:p14="http://schemas.microsoft.com/office/powerpoint/2010/main" val="3593449306"/>
       </p:ext>
     </p:extLst>
   </p:cSld>
@@ -6074,7 +6137,7 @@
     </p:spTree>
     <p:extLst>
       <p:ext uri="{BB962C8B-B14F-4D97-AF65-F5344CB8AC3E}">
-        <p14:creationId xmlns:p14="http://schemas.microsoft.com/office/powerpoint/2010/main" val="3090021879"/>
+        <p14:creationId xmlns:p14="http://schemas.microsoft.com/office/powerpoint/2010/main" val="2828349501"/>
       </p:ext>
     </p:extLst>
   </p:cSld>
@@ -6151,7 +6214,7 @@
     </p:spTree>
     <p:extLst>
       <p:ext uri="{BB962C8B-B14F-4D97-AF65-F5344CB8AC3E}">
-        <p14:creationId xmlns:p14="http://schemas.microsoft.com/office/powerpoint/2010/main" val="3093978646"/>
+        <p14:creationId xmlns:p14="http://schemas.microsoft.com/office/powerpoint/2010/main" val="3090021879"/>
       </p:ext>
     </p:extLst>
   </p:cSld>
@@ -6228,7 +6291,7 @@
     </p:spTree>
     <p:extLst>
       <p:ext uri="{BB962C8B-B14F-4D97-AF65-F5344CB8AC3E}">
-        <p14:creationId xmlns:p14="http://schemas.microsoft.com/office/powerpoint/2010/main" val="4090610748"/>
+        <p14:creationId xmlns:p14="http://schemas.microsoft.com/office/powerpoint/2010/main" val="3093978646"/>
       </p:ext>
     </p:extLst>
   </p:cSld>
@@ -6305,7 +6368,7 @@
     </p:spTree>
     <p:extLst>
       <p:ext uri="{BB962C8B-B14F-4D97-AF65-F5344CB8AC3E}">
-        <p14:creationId xmlns:p14="http://schemas.microsoft.com/office/powerpoint/2010/main" val="2162604372"/>
+        <p14:creationId xmlns:p14="http://schemas.microsoft.com/office/powerpoint/2010/main" val="4090610748"/>
       </p:ext>
     </p:extLst>
   </p:cSld>
@@ -6414,7 +6477,7 @@
                 <a:latin typeface="Times New Roman" panose="02020603050405020304" pitchFamily="18" charset="0"/>
                 <a:cs typeface="Times New Roman" panose="02020603050405020304" pitchFamily="18" charset="0"/>
               </a:rPr>
-              <a:t>4. Giải pháp</a:t>
+              <a:t>4. Công nghệ</a:t>
             </a:r>
           </a:p>
           <a:p>
@@ -6424,7 +6487,7 @@
                 <a:latin typeface="Times New Roman" panose="02020603050405020304" pitchFamily="18" charset="0"/>
                 <a:cs typeface="Times New Roman" panose="02020603050405020304" pitchFamily="18" charset="0"/>
               </a:rPr>
-              <a:t>5. Kết quả</a:t>
+              <a:t>5. Giải thuật</a:t>
             </a:r>
           </a:p>
           <a:p>
@@ -6434,7 +6497,17 @@
                 <a:latin typeface="Times New Roman" panose="02020603050405020304" pitchFamily="18" charset="0"/>
                 <a:cs typeface="Times New Roman" panose="02020603050405020304" pitchFamily="18" charset="0"/>
               </a:rPr>
-              <a:t>6. Kết luận</a:t>
+              <a:t>6. Kết quả</a:t>
+            </a:r>
+          </a:p>
+          <a:p>
+            <a:pPr algn="just"/>
+            <a:r>
+              <a:rPr lang="vi-VN" dirty="0">
+                <a:latin typeface="Times New Roman" panose="02020603050405020304" pitchFamily="18" charset="0"/>
+                <a:cs typeface="Times New Roman" panose="02020603050405020304" pitchFamily="18" charset="0"/>
+              </a:rPr>
+              <a:t>7. Kết luận</a:t>
             </a:r>
             <a:endParaRPr lang="en-US" dirty="0">
               <a:latin typeface="Times New Roman" panose="02020603050405020304" pitchFamily="18" charset="0"/>
@@ -6523,6 +6596,83 @@
     </p:spTree>
     <p:extLst>
       <p:ext uri="{BB962C8B-B14F-4D97-AF65-F5344CB8AC3E}">
+        <p14:creationId xmlns:p14="http://schemas.microsoft.com/office/powerpoint/2010/main" val="2162604372"/>
+      </p:ext>
+    </p:extLst>
+  </p:cSld>
+  <p:clrMapOvr>
+    <a:masterClrMapping/>
+  </p:clrMapOvr>
+</p:sld>
+</file>
+
+<file path=ppt/slides/slide21.xml><?xml version="1.0" encoding="utf-8"?>
+<p:sld xmlns:a="http://schemas.openxmlformats.org/drawingml/2006/main" xmlns:r="http://schemas.openxmlformats.org/officeDocument/2006/relationships" xmlns:p="http://schemas.openxmlformats.org/presentationml/2006/main">
+  <p:cSld>
+    <p:spTree>
+      <p:nvGrpSpPr>
+        <p:cNvPr id="1" name=""/>
+        <p:cNvGrpSpPr/>
+        <p:nvPr/>
+      </p:nvGrpSpPr>
+      <p:grpSpPr>
+        <a:xfrm>
+          <a:off x="0" y="0"/>
+          <a:ext cx="0" cy="0"/>
+          <a:chOff x="0" y="0"/>
+          <a:chExt cx="0" cy="0"/>
+        </a:xfrm>
+      </p:grpSpPr>
+      <p:sp>
+        <p:nvSpPr>
+          <p:cNvPr id="2" name="Title 1"/>
+          <p:cNvSpPr>
+            <a:spLocks noGrp="1"/>
+          </p:cNvSpPr>
+          <p:nvPr>
+            <p:ph type="title"/>
+          </p:nvPr>
+        </p:nvSpPr>
+        <p:spPr/>
+        <p:txBody>
+          <a:bodyPr/>
+          <a:lstStyle/>
+          <a:p>
+            <a:endParaRPr lang="en-US" dirty="0">
+              <a:latin typeface="Times New Roman" panose="02020603050405020304" pitchFamily="18" charset="0"/>
+              <a:cs typeface="Times New Roman" panose="02020603050405020304" pitchFamily="18" charset="0"/>
+            </a:endParaRPr>
+          </a:p>
+        </p:txBody>
+      </p:sp>
+      <p:sp>
+        <p:nvSpPr>
+          <p:cNvPr id="3" name="Content Placeholder 2"/>
+          <p:cNvSpPr>
+            <a:spLocks noGrp="1"/>
+          </p:cNvSpPr>
+          <p:nvPr>
+            <p:ph idx="1"/>
+          </p:nvPr>
+        </p:nvSpPr>
+        <p:spPr/>
+        <p:txBody>
+          <a:bodyPr>
+            <a:normAutofit/>
+          </a:bodyPr>
+          <a:lstStyle/>
+          <a:p>
+            <a:pPr algn="just"/>
+            <a:endParaRPr lang="en-US" dirty="0">
+              <a:latin typeface="Times New Roman" panose="02020603050405020304" pitchFamily="18" charset="0"/>
+              <a:cs typeface="Times New Roman" panose="02020603050405020304" pitchFamily="18" charset="0"/>
+            </a:endParaRPr>
+          </a:p>
+        </p:txBody>
+      </p:sp>
+    </p:spTree>
+    <p:extLst>
+      <p:ext uri="{BB962C8B-B14F-4D97-AF65-F5344CB8AC3E}">
         <p14:creationId xmlns:p14="http://schemas.microsoft.com/office/powerpoint/2010/main" val="1792440788"/>
       </p:ext>
     </p:extLst>
@@ -6628,7 +6778,9 @@
             </a:r>
           </a:p>
           <a:p>
-            <a:pPr algn="just"/>
+            <a:pPr marL="0" indent="0" algn="just">
+              <a:buNone/>
+            </a:pPr>
             <a:r>
               <a:rPr lang="vi-VN" dirty="0">
                 <a:latin typeface="Times New Roman" panose="02020603050405020304" pitchFamily="18" charset="0"/>
@@ -6846,7 +6998,9 @@
             </a:r>
           </a:p>
           <a:p>
-            <a:pPr algn="just"/>
+            <a:pPr marL="0" indent="0" algn="just">
+              <a:buNone/>
+            </a:pPr>
             <a:r>
               <a:rPr lang="vi-VN" dirty="0">
                 <a:latin typeface="Times New Roman" panose="02020603050405020304" pitchFamily="18" charset="0"/>
@@ -6976,6 +7130,27 @@
           </a:p>
           <a:p>
             <a:pPr algn="just"/>
+            <a:r>
+              <a:rPr lang="vi-VN" dirty="0">
+                <a:latin typeface="Times New Roman" panose="02020603050405020304" pitchFamily="18" charset="0"/>
+                <a:cs typeface="Times New Roman" panose="02020603050405020304" pitchFamily="18" charset="0"/>
+              </a:rPr>
+              <a:t>Mô hình hoá bài toán, hướng tiếp cận</a:t>
+            </a:r>
+            <a:endParaRPr lang="en-US" dirty="0">
+              <a:latin typeface="Times New Roman" panose="02020603050405020304" pitchFamily="18" charset="0"/>
+              <a:cs typeface="Times New Roman" panose="02020603050405020304" pitchFamily="18" charset="0"/>
+            </a:endParaRPr>
+          </a:p>
+          <a:p>
+            <a:pPr algn="just"/>
+            <a:endParaRPr lang="vi-VN" dirty="0">
+              <a:latin typeface="Times New Roman" panose="02020603050405020304" pitchFamily="18" charset="0"/>
+              <a:cs typeface="Times New Roman" panose="02020603050405020304" pitchFamily="18" charset="0"/>
+            </a:endParaRPr>
+          </a:p>
+          <a:p>
+            <a:pPr algn="just"/>
             <a:endParaRPr lang="en-US" dirty="0">
               <a:latin typeface="Times New Roman" panose="02020603050405020304" pitchFamily="18" charset="0"/>
               <a:cs typeface="Times New Roman" panose="02020603050405020304" pitchFamily="18" charset="0"/>
@@ -7060,6 +7235,42 @@
           <a:lstStyle/>
           <a:p>
             <a:pPr algn="just"/>
+            <a:r>
+              <a:rPr lang="vi-VN" dirty="0">
+                <a:latin typeface="Times New Roman" panose="02020603050405020304" pitchFamily="18" charset="0"/>
+                <a:cs typeface="Times New Roman" panose="02020603050405020304" pitchFamily="18" charset="0"/>
+              </a:rPr>
+              <a:t>Model: </a:t>
+            </a:r>
+            <a:r>
+              <a:rPr lang="vi-VN" dirty="0">
+                <a:effectLst/>
+              </a:rPr>
+              <a:t>Issue - Rule – Application – Conclusion</a:t>
+            </a:r>
+            <a:endParaRPr lang="en-US" dirty="0">
+              <a:effectLst/>
+            </a:endParaRPr>
+          </a:p>
+          <a:p>
+            <a:pPr algn="just"/>
+            <a:r>
+              <a:rPr lang="vi-VN" dirty="0">
+                <a:latin typeface="Times New Roman" panose="02020603050405020304" pitchFamily="18" charset="0"/>
+                <a:cs typeface="Times New Roman" panose="02020603050405020304" pitchFamily="18" charset="0"/>
+              </a:rPr>
+              <a:t>Luật Doanh Nghiệp 2014:</a:t>
+            </a:r>
+          </a:p>
+          <a:p>
+            <a:pPr lvl="1" algn="just"/>
+            <a:r>
+              <a:rPr lang="vi-VN" dirty="0">
+                <a:latin typeface="Times New Roman" panose="02020603050405020304" pitchFamily="18" charset="0"/>
+                <a:cs typeface="Times New Roman" panose="02020603050405020304" pitchFamily="18" charset="0"/>
+              </a:rPr>
+              <a:t>10 chương quy định 213 điều</a:t>
+            </a:r>
             <a:endParaRPr lang="en-US" dirty="0">
               <a:latin typeface="Times New Roman" panose="02020603050405020304" pitchFamily="18" charset="0"/>
               <a:cs typeface="Times New Roman" panose="02020603050405020304" pitchFamily="18" charset="0"/>
@@ -7117,7 +7328,7 @@
                 <a:latin typeface="Times New Roman" panose="02020603050405020304" pitchFamily="18" charset="0"/>
                 <a:cs typeface="Times New Roman" panose="02020603050405020304" pitchFamily="18" charset="0"/>
               </a:rPr>
-              <a:t>4. Giải pháp</a:t>
+              <a:t>4. Công nghệ</a:t>
             </a:r>
             <a:endParaRPr lang="en-US" dirty="0">
               <a:latin typeface="Times New Roman" panose="02020603050405020304" pitchFamily="18" charset="0"/>
@@ -7144,6 +7355,30 @@
           <a:lstStyle/>
           <a:p>
             <a:pPr algn="just"/>
+            <a:r>
+              <a:rPr lang="vi-VN">
+                <a:latin typeface="Times New Roman" panose="02020603050405020304" pitchFamily="18" charset="0"/>
+                <a:cs typeface="Times New Roman" panose="02020603050405020304" pitchFamily="18" charset="0"/>
+              </a:rPr>
+              <a:t>Word </a:t>
+            </a:r>
+            <a:r>
+              <a:rPr lang="vi-VN" dirty="0">
+                <a:latin typeface="Times New Roman" panose="02020603050405020304" pitchFamily="18" charset="0"/>
+                <a:cs typeface="Times New Roman" panose="02020603050405020304" pitchFamily="18" charset="0"/>
+              </a:rPr>
+              <a:t>segmentation </a:t>
+            </a:r>
+          </a:p>
+          <a:p>
+            <a:pPr algn="just"/>
+            <a:r>
+              <a:rPr lang="vi-VN" dirty="0">
+                <a:latin typeface="Times New Roman" panose="02020603050405020304" pitchFamily="18" charset="0"/>
+                <a:cs typeface="Times New Roman" panose="02020603050405020304" pitchFamily="18" charset="0"/>
+              </a:rPr>
+              <a:t>Classification using neural network</a:t>
+            </a:r>
             <a:endParaRPr lang="en-US" dirty="0">
               <a:latin typeface="Times New Roman" panose="02020603050405020304" pitchFamily="18" charset="0"/>
               <a:cs typeface="Times New Roman" panose="02020603050405020304" pitchFamily="18" charset="0"/>
@@ -7201,7 +7436,7 @@
                 <a:latin typeface="Times New Roman" panose="02020603050405020304" pitchFamily="18" charset="0"/>
                 <a:cs typeface="Times New Roman" panose="02020603050405020304" pitchFamily="18" charset="0"/>
               </a:rPr>
-              <a:t>5. Kết quả</a:t>
+              <a:t>5. Giải thuật</a:t>
             </a:r>
             <a:endParaRPr lang="en-US" dirty="0">
               <a:latin typeface="Times New Roman" panose="02020603050405020304" pitchFamily="18" charset="0"/>
@@ -7226,6 +7461,66 @@
             <a:normAutofit/>
           </a:bodyPr>
           <a:lstStyle/>
+          <a:p>
+            <a:pPr algn="just"/>
+            <a:r>
+              <a:rPr lang="vi-VN" dirty="0">
+                <a:latin typeface="Times New Roman" panose="02020603050405020304" pitchFamily="18" charset="0"/>
+                <a:cs typeface="Times New Roman" panose="02020603050405020304" pitchFamily="18" charset="0"/>
+              </a:rPr>
+              <a:t>Mô hình hoá input: vector</a:t>
+            </a:r>
+            <a:endParaRPr lang="en-US" dirty="0">
+              <a:latin typeface="Times New Roman" panose="02020603050405020304" pitchFamily="18" charset="0"/>
+              <a:cs typeface="Times New Roman" panose="02020603050405020304" pitchFamily="18" charset="0"/>
+            </a:endParaRPr>
+          </a:p>
+          <a:p>
+            <a:pPr lvl="1" algn="just"/>
+            <a:r>
+              <a:rPr lang="en-US" dirty="0">
+                <a:latin typeface="Times New Roman" panose="02020603050405020304" pitchFamily="18" charset="0"/>
+                <a:cs typeface="Times New Roman" panose="02020603050405020304" pitchFamily="18" charset="0"/>
+              </a:rPr>
+              <a:t>Word segmentation</a:t>
+            </a:r>
+          </a:p>
+          <a:p>
+            <a:pPr lvl="1" algn="just"/>
+            <a:r>
+              <a:rPr lang="en-US" dirty="0">
+                <a:latin typeface="Times New Roman" panose="02020603050405020304" pitchFamily="18" charset="0"/>
+                <a:cs typeface="Times New Roman" panose="02020603050405020304" pitchFamily="18" charset="0"/>
+              </a:rPr>
+              <a:t>T</a:t>
+            </a:r>
+            <a:r>
+              <a:rPr lang="vi-VN" dirty="0">
+                <a:latin typeface="Times New Roman" panose="02020603050405020304" pitchFamily="18" charset="0"/>
+                <a:cs typeface="Times New Roman" panose="02020603050405020304" pitchFamily="18" charset="0"/>
+              </a:rPr>
+              <a:t>ừ điển</a:t>
+            </a:r>
+          </a:p>
+          <a:p>
+            <a:pPr algn="just"/>
+            <a:r>
+              <a:rPr lang="vi-VN" dirty="0">
+                <a:latin typeface="Times New Roman" panose="02020603050405020304" pitchFamily="18" charset="0"/>
+                <a:cs typeface="Times New Roman" panose="02020603050405020304" pitchFamily="18" charset="0"/>
+              </a:rPr>
+              <a:t>Mô hình hoá output: số thứ tự trong điều  luật(1 điều/ 213 điều)</a:t>
+            </a:r>
+          </a:p>
+          <a:p>
+            <a:pPr marL="0" indent="0" algn="just">
+              <a:buNone/>
+            </a:pPr>
+            <a:endParaRPr lang="vi-VN" dirty="0">
+              <a:latin typeface="Times New Roman" panose="02020603050405020304" pitchFamily="18" charset="0"/>
+              <a:cs typeface="Times New Roman" panose="02020603050405020304" pitchFamily="18" charset="0"/>
+            </a:endParaRPr>
+          </a:p>
           <a:p>
             <a:pPr algn="just"/>
             <a:endParaRPr lang="en-US" dirty="0">
@@ -7238,7 +7533,7 @@
     </p:spTree>
     <p:extLst>
       <p:ext uri="{BB962C8B-B14F-4D97-AF65-F5344CB8AC3E}">
-        <p14:creationId xmlns:p14="http://schemas.microsoft.com/office/powerpoint/2010/main" val="444544940"/>
+        <p14:creationId xmlns:p14="http://schemas.microsoft.com/office/powerpoint/2010/main" val="3109142394"/>
       </p:ext>
     </p:extLst>
   </p:cSld>

</xml_diff>